<commit_message>
lesson5 : add Catagory
</commit_message>
<xml_diff>
--- a/lecture/lesson.pptx
+++ b/lecture/lesson.pptx
@@ -24,7 +24,10 @@
     <p:sldId id="272" r:id="rId19"/>
     <p:sldId id="273" r:id="rId20"/>
     <p:sldId id="275" r:id="rId21"/>
-    <p:sldId id="274" r:id="rId22"/>
+    <p:sldId id="276" r:id="rId22"/>
+    <p:sldId id="274" r:id="rId23"/>
+    <p:sldId id="277" r:id="rId24"/>
+    <p:sldId id="278" r:id="rId25"/>
   </p:sldIdLst>
   <p:sldSz cx="9144000" cy="6858000" type="screen4x3"/>
   <p:notesSz cx="6858000" cy="9144000"/>
@@ -221,7 +224,7 @@
             <a:srgbClr val="A4A3A4"/>
           </p15:clr>
         </p15:guide>
-        <p15:guide id="2" pos="2880" userDrawn="1">
+        <p15:guide id="2" pos="2886" userDrawn="1">
           <p15:clr>
             <a:srgbClr val="A4A3A4"/>
           </p15:clr>
@@ -5806,43 +5809,9 @@
             </a:endParaRPr>
           </a:p>
           <a:p>
-            <a:pPr marL="0" indent="0">
-              <a:buNone/>
-            </a:pPr>
-            <a:endParaRPr lang="en-US" altLang="zh-CN">
-              <a:solidFill>
-                <a:srgbClr val="FF0000"/>
-              </a:solidFill>
-            </a:endParaRPr>
-          </a:p>
-          <a:p>
             <a:pPr marL="0" indent="457200" algn="l">
               <a:buNone/>
             </a:pPr>
-            <a:r>
-              <a:rPr lang="en-US" altLang="zh-CN" sz="1400">
-                <a:solidFill>
-                  <a:schemeClr val="tx1"/>
-                </a:solidFill>
-              </a:rPr>
-              <a:t>an &lt;input&gt; becomes a </a:t>
-            </a:r>
-            <a:r>
-              <a:rPr lang="en-US" altLang="zh-CN" sz="1400" b="1">
-                <a:solidFill>
-                  <a:schemeClr val="tx1"/>
-                </a:solidFill>
-              </a:rPr>
-              <a:t>controlled component</a:t>
-            </a:r>
-            <a:r>
-              <a:rPr lang="en-US" altLang="zh-CN" sz="1400">
-                <a:solidFill>
-                  <a:schemeClr val="tx1"/>
-                </a:solidFill>
-              </a:rPr>
-              <a:t> when its value is fully managed by React state 	 via    two key props:</a:t>
-            </a:r>
             <a:endParaRPr lang="en-US" altLang="zh-CN" sz="1400">
               <a:solidFill>
                 <a:schemeClr val="tx1"/>
@@ -5850,10 +5819,18 @@
             </a:endParaRPr>
           </a:p>
           <a:p>
-            <a:pPr marL="0" indent="457200" algn="l">
-              <a:buNone/>
-            </a:pPr>
-            <a:endParaRPr lang="en-US" altLang="zh-CN" sz="1400">
+            <a:pPr marL="457200" lvl="1" indent="0">
+              <a:buNone/>
+            </a:pPr>
+            <a:r>
+              <a:rPr lang="en-US" altLang="zh-CN" sz="1225" b="1">
+                <a:solidFill>
+                  <a:schemeClr val="tx1"/>
+                </a:solidFill>
+              </a:rPr>
+              <a:t>1)value -&gt; Bound to a state variable.</a:t>
+            </a:r>
+            <a:endParaRPr lang="en-US" altLang="zh-CN" sz="1225" b="1">
               <a:solidFill>
                 <a:schemeClr val="tx1"/>
               </a:solidFill>
@@ -5864,12 +5841,64 @@
               <a:buNone/>
             </a:pPr>
             <a:r>
-              <a:rPr lang="en-US" altLang="zh-CN" sz="1225">
+              <a:rPr lang="en-US" altLang="zh-CN" sz="1225" b="1">
                 <a:solidFill>
                   <a:schemeClr val="tx1"/>
                 </a:solidFill>
               </a:rPr>
-              <a:t>1)value -&gt; Bound to a state variable.</a:t>
+              <a:t>2)onChange -&gt; Updates the state when the user types.</a:t>
+            </a:r>
+            <a:endParaRPr lang="en-US" altLang="zh-CN" sz="1225" b="1">
+              <a:solidFill>
+                <a:schemeClr val="tx1"/>
+              </a:solidFill>
+            </a:endParaRPr>
+          </a:p>
+          <a:p>
+            <a:pPr marL="457200" lvl="1" indent="0">
+              <a:buNone/>
+            </a:pPr>
+            <a:endParaRPr lang="en-US" altLang="zh-CN" sz="1225" b="1">
+              <a:solidFill>
+                <a:schemeClr val="tx1"/>
+              </a:solidFill>
+            </a:endParaRPr>
+          </a:p>
+          <a:p>
+            <a:pPr marL="457200" lvl="1" indent="0">
+              <a:buNone/>
+            </a:pPr>
+            <a:r>
+              <a:rPr lang="en-US" altLang="zh-CN" sz="1225">
+                <a:sym typeface="+mn-ea"/>
+              </a:rPr>
+              <a:t>note:</a:t>
+            </a:r>
+            <a:endParaRPr lang="en-US" altLang="zh-CN" sz="1225">
+              <a:sym typeface="+mn-ea"/>
+            </a:endParaRPr>
+          </a:p>
+          <a:p>
+            <a:pPr marL="457200" lvl="1" indent="0">
+              <a:buNone/>
+            </a:pPr>
+            <a:r>
+              <a:rPr lang="en-US" altLang="zh-CN" sz="1225">
+                <a:sym typeface="+mn-ea"/>
+              </a:rPr>
+              <a:t>an &lt;input&gt; becomes a </a:t>
+            </a:r>
+            <a:r>
+              <a:rPr lang="en-US" altLang="zh-CN" sz="1225" b="1">
+                <a:sym typeface="+mn-ea"/>
+              </a:rPr>
+              <a:t>controlled component</a:t>
+            </a:r>
+            <a:r>
+              <a:rPr lang="en-US" altLang="zh-CN" sz="1225">
+                <a:sym typeface="+mn-ea"/>
+              </a:rPr>
+              <a:t> when its value is fully managed by React state 	 via    two key props:</a:t>
             </a:r>
             <a:endParaRPr lang="en-US" altLang="zh-CN" sz="1225">
               <a:solidFill>
@@ -5881,15 +5910,7 @@
             <a:pPr marL="457200" lvl="1" indent="0">
               <a:buNone/>
             </a:pPr>
-            <a:r>
-              <a:rPr lang="en-US" altLang="zh-CN" sz="1225">
-                <a:solidFill>
-                  <a:schemeClr val="tx1"/>
-                </a:solidFill>
-              </a:rPr>
-              <a:t>2)onChange -&gt; Updates the state when the user types.</a:t>
-            </a:r>
-            <a:endParaRPr lang="en-US" altLang="zh-CN" sz="1225">
+            <a:endParaRPr lang="en-US" altLang="zh-CN" sz="1225" b="1">
               <a:solidFill>
                 <a:schemeClr val="tx1"/>
               </a:solidFill>
@@ -6048,6 +6069,246 @@
             <p:ph type="title"/>
           </p:nvPr>
         </p:nvSpPr>
+        <p:spPr/>
+        <p:txBody>
+          <a:bodyPr/>
+          <a:p>
+            <a:r>
+              <a:rPr lang="en-US" altLang="zh-CN">
+                <a:sym typeface="+mn-ea"/>
+              </a:rPr>
+              <a:t>Form(3)antd Form</a:t>
+            </a:r>
+            <a:endParaRPr lang="zh-CN" altLang="en-US"/>
+          </a:p>
+        </p:txBody>
+      </p:sp>
+      <p:sp>
+        <p:nvSpPr>
+          <p:cNvPr id="3" name="内容占位符 2"/>
+          <p:cNvSpPr>
+            <a:spLocks noGrp="1"/>
+          </p:cNvSpPr>
+          <p:nvPr>
+            <p:ph idx="1"/>
+          </p:nvPr>
+        </p:nvSpPr>
+        <p:spPr>
+          <a:xfrm>
+            <a:off x="457200" y="1268730"/>
+            <a:ext cx="8229600" cy="4525963"/>
+          </a:xfrm>
+        </p:spPr>
+        <p:txBody>
+          <a:bodyPr/>
+          <a:p>
+            <a:r>
+              <a:rPr lang="en-US" altLang="zh-CN" sz="1400"/>
+              <a:t>class LoginForm extends React.Component {</a:t>
+            </a:r>
+            <a:endParaRPr lang="en-US" altLang="zh-CN" sz="1400"/>
+          </a:p>
+          <a:p>
+            <a:r>
+              <a:rPr lang="en-US" altLang="zh-CN" sz="1400"/>
+              <a:t>  </a:t>
+            </a:r>
+            <a:r>
+              <a:rPr lang="en-US" altLang="zh-CN" sz="1400">
+                <a:solidFill>
+                  <a:srgbClr val="FF0000"/>
+                </a:solidFill>
+              </a:rPr>
+              <a:t>formRef = React.createRef()</a:t>
+            </a:r>
+            <a:r>
+              <a:rPr lang="en-US" altLang="zh-CN" sz="1400"/>
+              <a:t>; // Ref to access Form instance</a:t>
+            </a:r>
+            <a:endParaRPr lang="en-US" altLang="zh-CN" sz="1400"/>
+          </a:p>
+          <a:p>
+            <a:r>
+              <a:rPr lang="en-US" altLang="zh-CN" sz="1400"/>
+              <a:t>  handleSubmit = () =&gt; {</a:t>
+            </a:r>
+            <a:endParaRPr lang="en-US" altLang="zh-CN" sz="1400"/>
+          </a:p>
+          <a:p>
+            <a:r>
+              <a:rPr lang="en-US" altLang="zh-CN" sz="1400"/>
+              <a:t>    </a:t>
+            </a:r>
+            <a:r>
+              <a:rPr lang="en-US" altLang="zh-CN" sz="1400">
+                <a:solidFill>
+                  <a:srgbClr val="FF0000"/>
+                </a:solidFill>
+              </a:rPr>
+              <a:t>this.formRef.current.</a:t>
+            </a:r>
+            <a:r>
+              <a:rPr lang="en-US" altLang="zh-CN" sz="1400"/>
+              <a:t>validateFields() .then((values) =&gt; {</a:t>
+            </a:r>
+            <a:endParaRPr lang="en-US" altLang="zh-CN" sz="1400"/>
+          </a:p>
+          <a:p>
+            <a:r>
+              <a:rPr lang="en-US" altLang="zh-CN" sz="1400"/>
+              <a:t>        console.log('Submitted values:', values);})</a:t>
+            </a:r>
+            <a:endParaRPr lang="en-US" altLang="zh-CN" sz="1400"/>
+          </a:p>
+          <a:p>
+            <a:r>
+              <a:rPr lang="en-US" altLang="zh-CN" sz="1400"/>
+              <a:t>      .catch((err) =&gt; {console.error('Validation failed:', err);});</a:t>
+            </a:r>
+            <a:endParaRPr lang="en-US" altLang="zh-CN" sz="1400"/>
+          </a:p>
+          <a:p>
+            <a:r>
+              <a:rPr lang="en-US" altLang="zh-CN" sz="1400"/>
+              <a:t>  };</a:t>
+            </a:r>
+            <a:endParaRPr lang="en-US" altLang="zh-CN" sz="1400"/>
+          </a:p>
+          <a:p>
+            <a:r>
+              <a:rPr lang="en-US" altLang="zh-CN" sz="1400"/>
+              <a:t>   render() {</a:t>
+            </a:r>
+            <a:endParaRPr lang="en-US" altLang="zh-CN" sz="1400"/>
+          </a:p>
+          <a:p>
+            <a:r>
+              <a:rPr lang="en-US" altLang="zh-CN" sz="1400"/>
+              <a:t>    return (</a:t>
+            </a:r>
+            <a:endParaRPr lang="en-US" altLang="zh-CN" sz="1400"/>
+          </a:p>
+          <a:p>
+            <a:r>
+              <a:rPr lang="en-US" altLang="zh-CN" sz="1400"/>
+              <a:t>      &lt;Form ref={this.formRef} // Assign the ref initialValues={{ remember: true }} &gt;</a:t>
+            </a:r>
+            <a:endParaRPr lang="en-US" altLang="zh-CN" sz="1400"/>
+          </a:p>
+          <a:p>
+            <a:r>
+              <a:rPr lang="en-US" altLang="zh-CN" sz="1400"/>
+              <a:t>        &lt;Form.Item name="username" rules={[{ required: true, message: 'input your username!' }]}&gt;</a:t>
+            </a:r>
+            <a:endParaRPr lang="en-US" altLang="zh-CN" sz="1400"/>
+          </a:p>
+          <a:p>
+            <a:r>
+              <a:rPr lang="en-US" altLang="zh-CN" sz="1400"/>
+              <a:t>          &lt;Input placeholder="Username" /&gt;</a:t>
+            </a:r>
+            <a:endParaRPr lang="en-US" altLang="zh-CN" sz="1400"/>
+          </a:p>
+          <a:p>
+            <a:r>
+              <a:rPr lang="en-US" altLang="zh-CN" sz="1400"/>
+              <a:t>        &lt;/Form.Item&gt;</a:t>
+            </a:r>
+            <a:endParaRPr lang="en-US" altLang="zh-CN" sz="1400"/>
+          </a:p>
+          <a:p>
+            <a:r>
+              <a:rPr lang="en-US" altLang="zh-CN" sz="1400"/>
+              <a:t>        &lt;Form.Item name="password" rules={[{ required: true, message: ‘input your password!' }]}&gt;</a:t>
+            </a:r>
+            <a:endParaRPr lang="en-US" altLang="zh-CN" sz="1400"/>
+          </a:p>
+          <a:p>
+            <a:r>
+              <a:rPr lang="en-US" altLang="zh-CN" sz="1400"/>
+              <a:t>          &lt;Input.Password placeholder="Password" /&gt;</a:t>
+            </a:r>
+            <a:endParaRPr lang="en-US" altLang="zh-CN" sz="1400"/>
+          </a:p>
+          <a:p>
+            <a:r>
+              <a:rPr lang="en-US" altLang="zh-CN" sz="1400"/>
+              <a:t>        &lt;/Form.Item&gt;</a:t>
+            </a:r>
+            <a:endParaRPr lang="en-US" altLang="zh-CN" sz="1400"/>
+          </a:p>
+          <a:p>
+            <a:r>
+              <a:rPr lang="en-US" altLang="zh-CN" sz="1400"/>
+              <a:t>        &lt;Button onClick={this.handleSubmit} type="primary"&gt; Log in &lt;/Button&gt;</a:t>
+            </a:r>
+            <a:endParaRPr lang="en-US" altLang="zh-CN" sz="1400"/>
+          </a:p>
+          <a:p>
+            <a:r>
+              <a:rPr lang="en-US" altLang="zh-CN" sz="1400"/>
+              <a:t>&lt;/Form&gt;</a:t>
+            </a:r>
+            <a:endParaRPr lang="en-US" altLang="zh-CN" sz="1400"/>
+          </a:p>
+          <a:p>
+            <a:r>
+              <a:rPr lang="en-US" altLang="zh-CN" sz="1400"/>
+              <a:t>    );</a:t>
+            </a:r>
+            <a:endParaRPr lang="en-US" altLang="zh-CN" sz="1400"/>
+          </a:p>
+          <a:p>
+            <a:r>
+              <a:rPr lang="en-US" altLang="zh-CN" sz="1400"/>
+              <a:t>  }</a:t>
+            </a:r>
+            <a:endParaRPr lang="en-US" altLang="zh-CN" sz="1400"/>
+          </a:p>
+          <a:p>
+            <a:r>
+              <a:rPr lang="en-US" altLang="zh-CN" sz="1400"/>
+              <a:t>}</a:t>
+            </a:r>
+            <a:endParaRPr lang="en-US" altLang="zh-CN" sz="1400"/>
+          </a:p>
+          <a:p>
+            <a:r>
+              <a:rPr lang="en-US" altLang="zh-CN" sz="1400"/>
+              <a:t>export default LoginForm;</a:t>
+            </a:r>
+            <a:endParaRPr lang="en-US" altLang="zh-CN" sz="1400"/>
+          </a:p>
+        </p:txBody>
+      </p:sp>
+    </p:spTree>
+  </p:cSld>
+  <p:clrMapOvr>
+    <a:masterClrMapping/>
+  </p:clrMapOvr>
+</p:sld>
+</file>
+
+<file path=ppt/slides/slide21.xml><?xml version="1.0" encoding="utf-8"?>
+<p:sld xmlns:a="http://schemas.openxmlformats.org/drawingml/2006/main" xmlns:r="http://schemas.openxmlformats.org/officeDocument/2006/relationships" xmlns:p="http://schemas.openxmlformats.org/presentationml/2006/main">
+  <p:cSld>
+    <p:spTree>
+      <p:nvGrpSpPr>
+        <p:cNvPr id="1" name=""/>
+        <p:cNvGrpSpPr/>
+        <p:nvPr/>
+      </p:nvGrpSpPr>
+      <p:grpSpPr/>
+      <p:sp>
+        <p:nvSpPr>
+          <p:cNvPr id="2" name="标题 1"/>
+          <p:cNvSpPr>
+            <a:spLocks noGrp="1"/>
+          </p:cNvSpPr>
+          <p:nvPr>
+            <p:ph type="title"/>
+          </p:nvPr>
+        </p:nvSpPr>
         <p:spPr>
           <a:xfrm>
             <a:off x="147320" y="274955"/>
@@ -6093,7 +6354,7 @@
             </a:pPr>
             <a:r>
               <a:rPr lang="en-US" altLang="zh-CN" sz="1200" b="1"/>
-              <a:t>Comparison:                 Controlled(self-defined useForm)           Uncontrolled Inputs(react-hook-form)</a:t>
+              <a:t>Comparison:                 Controlled(antd Form)           Uncontrolled Inputs(react-hook-form)</a:t>
             </a:r>
             <a:endParaRPr lang="en-US" altLang="zh-CN" sz="1200" b="1"/>
           </a:p>
@@ -6140,6 +6401,1455 @@
             <a:r>
               <a:rPr lang="en-US" altLang="zh-CN" sz="1200"/>
               <a:t>Code	                  Manual value/onChange	                    Auto-magical with register</a:t>
+            </a:r>
+            <a:endParaRPr lang="en-US" altLang="zh-CN" sz="1200"/>
+          </a:p>
+        </p:txBody>
+      </p:sp>
+    </p:spTree>
+  </p:cSld>
+  <p:clrMapOvr>
+    <a:masterClrMapping/>
+  </p:clrMapOvr>
+</p:sld>
+</file>
+
+<file path=ppt/slides/slide22.xml><?xml version="1.0" encoding="utf-8"?>
+<p:sld xmlns:a="http://schemas.openxmlformats.org/drawingml/2006/main" xmlns:r="http://schemas.openxmlformats.org/officeDocument/2006/relationships" xmlns:p="http://schemas.openxmlformats.org/presentationml/2006/main">
+  <p:cSld>
+    <p:spTree>
+      <p:nvGrpSpPr>
+        <p:cNvPr id="1" name=""/>
+        <p:cNvGrpSpPr/>
+        <p:nvPr/>
+      </p:nvGrpSpPr>
+      <p:grpSpPr/>
+      <p:sp>
+        <p:nvSpPr>
+          <p:cNvPr id="2" name="标题 1"/>
+          <p:cNvSpPr>
+            <a:spLocks noGrp="1"/>
+          </p:cNvSpPr>
+          <p:nvPr>
+            <p:ph type="title"/>
+          </p:nvPr>
+        </p:nvSpPr>
+        <p:spPr>
+          <a:xfrm>
+            <a:off x="457200" y="-171767"/>
+            <a:ext cx="8229600" cy="1143000"/>
+          </a:xfrm>
+        </p:spPr>
+        <p:txBody>
+          <a:bodyPr/>
+          <a:p>
+            <a:r>
+              <a:rPr lang="en-US" altLang="zh-CN"/>
+              <a:t>Pass child form to Parent(1)</a:t>
+            </a:r>
+            <a:endParaRPr lang="zh-CN" altLang="en-US"/>
+          </a:p>
+        </p:txBody>
+      </p:sp>
+      <p:sp>
+        <p:nvSpPr>
+          <p:cNvPr id="3" name="内容占位符 2"/>
+          <p:cNvSpPr>
+            <a:spLocks noGrp="1"/>
+          </p:cNvSpPr>
+          <p:nvPr>
+            <p:ph idx="1"/>
+          </p:nvPr>
+        </p:nvSpPr>
+        <p:spPr>
+          <a:xfrm>
+            <a:off x="467995" y="826135"/>
+            <a:ext cx="8229600" cy="4525963"/>
+          </a:xfrm>
+        </p:spPr>
+        <p:txBody>
+          <a:bodyPr/>
+          <a:p>
+            <a:r>
+              <a:rPr lang="en-US" altLang="zh-CN" sz="1200"/>
+              <a:t>Wrapper</a:t>
+            </a:r>
+            <a:endParaRPr lang="en-US" altLang="zh-CN" sz="1200"/>
+          </a:p>
+          <a:p>
+            <a:pPr marL="1371600" lvl="3" indent="0" algn="just">
+              <a:buNone/>
+            </a:pPr>
+            <a:r>
+              <a:rPr lang="en-US" altLang="zh-CN" sz="750"/>
+              <a:t> </a:t>
+            </a:r>
+            <a:endParaRPr lang="en-US" altLang="zh-CN" sz="750"/>
+          </a:p>
+        </p:txBody>
+      </p:sp>
+      <p:sp>
+        <p:nvSpPr>
+          <p:cNvPr id="4" name="文本框 3"/>
+          <p:cNvSpPr txBox="1"/>
+          <p:nvPr/>
+        </p:nvSpPr>
+        <p:spPr>
+          <a:xfrm>
+            <a:off x="4860290" y="1600200"/>
+            <a:ext cx="4684395" cy="2516505"/>
+          </a:xfrm>
+          <a:prstGeom prst="rect">
+            <a:avLst/>
+          </a:prstGeom>
+          <a:noFill/>
+        </p:spPr>
+        <p:txBody>
+          <a:bodyPr wrap="square" rtlCol="0" anchor="t">
+            <a:noAutofit/>
+          </a:bodyPr>
+          <a:p>
+            <a:pPr marL="1371600" lvl="3" indent="0" algn="just">
+              <a:buNone/>
+            </a:pPr>
+            <a:r>
+              <a:rPr lang="en-US" altLang="zh-CN" sz="1000">
+                <a:sym typeface="+mn-ea"/>
+              </a:rPr>
+              <a:t> 	</a:t>
+            </a:r>
+            <a:endParaRPr lang="en-US" altLang="zh-CN" sz="1000">
+              <a:sym typeface="+mn-ea"/>
+            </a:endParaRPr>
+          </a:p>
+        </p:txBody>
+      </p:sp>
+      <p:sp>
+        <p:nvSpPr>
+          <p:cNvPr id="5" name="文本框 4"/>
+          <p:cNvSpPr txBox="1"/>
+          <p:nvPr/>
+        </p:nvSpPr>
+        <p:spPr>
+          <a:xfrm>
+            <a:off x="4932045" y="1268730"/>
+            <a:ext cx="5542280" cy="3223895"/>
+          </a:xfrm>
+          <a:prstGeom prst="rect">
+            <a:avLst/>
+          </a:prstGeom>
+        </p:spPr>
+        <p:txBody>
+          <a:bodyPr>
+            <a:noAutofit/>
+          </a:bodyPr>
+          <a:p>
+            <a:pPr marL="0" algn="l">
+              <a:buClrTx/>
+              <a:buSzTx/>
+              <a:buNone/>
+            </a:pPr>
+            <a:r>
+              <a:rPr lang="en-US" altLang="zh-CN" sz="1200" b="0" i="0">
+                <a:solidFill>
+                  <a:srgbClr val="81A1C1"/>
+                </a:solidFill>
+                <a:latin typeface="+mj-lt"/>
+                <a:ea typeface="Menlo"/>
+                <a:cs typeface="+mj-lt"/>
+              </a:rPr>
+              <a:t>//</a:t>
+            </a:r>
+            <a:r>
+              <a:rPr lang="en-US" altLang="zh-CN" sz="1200" b="0" i="0"/>
+              <a:t> Child function Component</a:t>
+            </a:r>
+            <a:endParaRPr lang="en-US" altLang="zh-CN" sz="1200" b="0" i="0"/>
+          </a:p>
+          <a:p>
+            <a:pPr marL="0" algn="l">
+              <a:buClrTx/>
+              <a:buSzTx/>
+              <a:buNone/>
+            </a:pPr>
+            <a:endParaRPr lang="en-US" altLang="zh-CN" sz="1000" b="0" i="0"/>
+          </a:p>
+          <a:p>
+            <a:pPr marL="0" algn="l">
+              <a:buClrTx/>
+              <a:buSzTx/>
+              <a:buNone/>
+            </a:pPr>
+            <a:r>
+              <a:rPr lang="en-US" altLang="zh-CN" sz="1000" b="0" i="0"/>
+              <a:t>const ChildWrapperAddForm = forwardRef(({ categorys, parentId }, ref) =&gt; {</a:t>
+            </a:r>
+            <a:endParaRPr lang="en-US" altLang="zh-CN" sz="1000" b="0" i="0"/>
+          </a:p>
+          <a:p>
+            <a:pPr marL="0" algn="l">
+              <a:buClrTx/>
+              <a:buSzTx/>
+              <a:buNone/>
+            </a:pPr>
+            <a:r>
+              <a:rPr lang="en-US" altLang="zh-CN" sz="1000" b="0" i="0">
+                <a:solidFill>
+                  <a:srgbClr val="FF0000"/>
+                </a:solidFill>
+              </a:rPr>
+              <a:t>  const [form] = Form.useForm();</a:t>
+            </a:r>
+            <a:endParaRPr lang="en-US" altLang="zh-CN" sz="1000" b="0" i="0">
+              <a:solidFill>
+                <a:srgbClr val="FF0000"/>
+              </a:solidFill>
+            </a:endParaRPr>
+          </a:p>
+          <a:p>
+            <a:pPr marL="0" algn="l">
+              <a:buClrTx/>
+              <a:buSzTx/>
+              <a:buNone/>
+            </a:pPr>
+            <a:r>
+              <a:rPr lang="en-US" altLang="zh-CN" sz="1000" b="0" i="0"/>
+              <a:t>  // </a:t>
+            </a:r>
+            <a:r>
+              <a:rPr lang="zh-CN" altLang="en-US" sz="1000" b="0" i="0"/>
+              <a:t>将内部方法暴露给外部使用</a:t>
+            </a:r>
+            <a:endParaRPr lang="zh-CN" altLang="en-US" sz="1000" b="0" i="0"/>
+          </a:p>
+          <a:p>
+            <a:pPr marL="0" algn="l">
+              <a:buClrTx/>
+              <a:buSzTx/>
+              <a:buNone/>
+            </a:pPr>
+            <a:r>
+              <a:rPr lang="en-US" altLang="zh-CN" sz="1000" b="0" i="0"/>
+              <a:t>  useImperativeHandle(ref, () =&gt; ({</a:t>
+            </a:r>
+            <a:endParaRPr lang="en-US" altLang="zh-CN" sz="1000" b="0" i="0"/>
+          </a:p>
+          <a:p>
+            <a:pPr marL="0" algn="l">
+              <a:buClrTx/>
+              <a:buSzTx/>
+              <a:buNone/>
+            </a:pPr>
+            <a:r>
+              <a:rPr lang="en-US" altLang="zh-CN" sz="1000" b="0" i="0"/>
+              <a:t>   </a:t>
+            </a:r>
+            <a:r>
+              <a:rPr lang="en-US" altLang="zh-CN" sz="1000" b="0" i="0">
+                <a:solidFill>
+                  <a:srgbClr val="FF0000"/>
+                </a:solidFill>
+              </a:rPr>
+              <a:t> validateFields: () =&gt; form.validateFields(),</a:t>
+            </a:r>
+            <a:endParaRPr lang="en-US" altLang="zh-CN" sz="1000" b="0" i="0">
+              <a:solidFill>
+                <a:srgbClr val="FF0000"/>
+              </a:solidFill>
+            </a:endParaRPr>
+          </a:p>
+          <a:p>
+            <a:pPr marL="0" algn="l">
+              <a:buClrTx/>
+              <a:buSzTx/>
+              <a:buNone/>
+            </a:pPr>
+            <a:r>
+              <a:rPr lang="en-US" altLang="zh-CN" sz="1000" b="0" i="0">
+                <a:solidFill>
+                  <a:srgbClr val="FF0000"/>
+                </a:solidFill>
+              </a:rPr>
+              <a:t>    getFieldsValue: () =&gt; form.getFieldsValue(),</a:t>
+            </a:r>
+            <a:endParaRPr lang="en-US" altLang="zh-CN" sz="1000" b="0" i="0">
+              <a:solidFill>
+                <a:srgbClr val="FF0000"/>
+              </a:solidFill>
+            </a:endParaRPr>
+          </a:p>
+          <a:p>
+            <a:pPr marL="0" algn="l">
+              <a:buClrTx/>
+              <a:buSzTx/>
+              <a:buNone/>
+            </a:pPr>
+            <a:r>
+              <a:rPr lang="en-US" altLang="zh-CN" sz="1000" b="0" i="0">
+                <a:solidFill>
+                  <a:srgbClr val="FF0000"/>
+                </a:solidFill>
+              </a:rPr>
+              <a:t>    resetFields: () =&gt; form.resetFields(),</a:t>
+            </a:r>
+            <a:endParaRPr lang="en-US" altLang="zh-CN" sz="1000" b="0" i="0">
+              <a:solidFill>
+                <a:srgbClr val="FF0000"/>
+              </a:solidFill>
+            </a:endParaRPr>
+          </a:p>
+          <a:p>
+            <a:pPr marL="0" algn="l">
+              <a:buClrTx/>
+              <a:buSzTx/>
+              <a:buNone/>
+            </a:pPr>
+            <a:r>
+              <a:rPr lang="en-US" altLang="zh-CN" sz="1000" b="0" i="0"/>
+              <a:t>  }));</a:t>
+            </a:r>
+            <a:endParaRPr lang="en-US" altLang="zh-CN" sz="1000" b="0" i="0"/>
+          </a:p>
+          <a:p>
+            <a:pPr marL="0" algn="l">
+              <a:buClrTx/>
+              <a:buSzTx/>
+              <a:buNone/>
+            </a:pPr>
+            <a:endParaRPr lang="en-US" altLang="zh-CN" sz="1000" b="0" i="0"/>
+          </a:p>
+          <a:p>
+            <a:pPr marL="0" algn="l">
+              <a:buClrTx/>
+              <a:buSzTx/>
+              <a:buNone/>
+            </a:pPr>
+            <a:r>
+              <a:rPr lang="en-US" altLang="zh-CN" sz="1000" b="0" i="0"/>
+              <a:t>  return (</a:t>
+            </a:r>
+            <a:endParaRPr lang="en-US" altLang="zh-CN" sz="1000" b="0" i="0"/>
+          </a:p>
+          <a:p>
+            <a:pPr marL="0" algn="l">
+              <a:buClrTx/>
+              <a:buSzTx/>
+              <a:buNone/>
+            </a:pPr>
+            <a:r>
+              <a:rPr lang="en-US" altLang="zh-CN" sz="1000" b="0" i="0"/>
+              <a:t>    &lt;Form </a:t>
+            </a:r>
+            <a:r>
+              <a:rPr lang="en-US" altLang="zh-CN" sz="1000" b="0" i="0">
+                <a:solidFill>
+                  <a:srgbClr val="FF0000"/>
+                </a:solidFill>
+              </a:rPr>
+              <a:t>form={form}</a:t>
+            </a:r>
+            <a:r>
+              <a:rPr lang="en-US" altLang="zh-CN" sz="1000" b="0" i="0"/>
+              <a:t>&gt;</a:t>
+            </a:r>
+            <a:endParaRPr lang="en-US" altLang="zh-CN" sz="1000" b="0" i="0"/>
+          </a:p>
+          <a:p>
+            <a:pPr marL="0" algn="l">
+              <a:buClrTx/>
+              <a:buSzTx/>
+              <a:buNone/>
+            </a:pPr>
+            <a:r>
+              <a:rPr lang="en-US" altLang="zh-CN" sz="1000" b="0" i="0"/>
+              <a:t>      &lt;Form.Item name='parentId' initialValue={parentId}&gt;</a:t>
+            </a:r>
+            <a:endParaRPr lang="en-US" altLang="zh-CN" sz="1000" b="0" i="0"/>
+          </a:p>
+          <a:p>
+            <a:pPr marL="0" algn="l">
+              <a:buClrTx/>
+              <a:buSzTx/>
+              <a:buNone/>
+            </a:pPr>
+            <a:r>
+              <a:rPr lang="en-US" altLang="zh-CN" sz="1000" b="0" i="0"/>
+              <a:t>        &lt;Select options={[{ value: '0', label: &lt;span&gt;</a:t>
+            </a:r>
+            <a:r>
+              <a:rPr lang="zh-CN" altLang="en-US" sz="1000" b="0" i="0"/>
+              <a:t>一级分类</a:t>
+            </a:r>
+            <a:r>
+              <a:rPr lang="en-US" altLang="zh-CN" sz="1000" b="0" i="0"/>
+              <a:t>&lt;/span&gt; }, ...categorys.map(c =&gt; ({ value: c._id, label: c.name }))]} /&gt;</a:t>
+            </a:r>
+            <a:endParaRPr lang="en-US" altLang="zh-CN" sz="1000" b="0" i="0"/>
+          </a:p>
+          <a:p>
+            <a:pPr marL="0" algn="l">
+              <a:buClrTx/>
+              <a:buSzTx/>
+              <a:buNone/>
+            </a:pPr>
+            <a:r>
+              <a:rPr lang="en-US" altLang="zh-CN" sz="1000" b="0" i="0"/>
+              <a:t>      &lt;/Form.Item&gt;</a:t>
+            </a:r>
+            <a:endParaRPr lang="en-US" altLang="zh-CN" sz="1000" b="0" i="0"/>
+          </a:p>
+          <a:p>
+            <a:pPr marL="0" algn="l">
+              <a:buClrTx/>
+              <a:buSzTx/>
+              <a:buNone/>
+            </a:pPr>
+            <a:r>
+              <a:rPr lang="en-US" altLang="zh-CN" sz="1000" b="0" i="0"/>
+              <a:t>       );</a:t>
+            </a:r>
+            <a:endParaRPr lang="en-US" altLang="zh-CN" sz="1000" b="0" i="0"/>
+          </a:p>
+          <a:p>
+            <a:pPr marL="0" algn="l">
+              <a:buClrTx/>
+              <a:buSzTx/>
+              <a:buNone/>
+            </a:pPr>
+            <a:r>
+              <a:rPr lang="en-US" altLang="zh-CN" sz="1000" b="0" i="0"/>
+              <a:t>});</a:t>
+            </a:r>
+            <a:endParaRPr lang="en-US" altLang="zh-CN" sz="1000" b="0" i="0"/>
+          </a:p>
+          <a:p>
+            <a:pPr marL="0" algn="l">
+              <a:buClrTx/>
+              <a:buSzTx/>
+              <a:buNone/>
+            </a:pPr>
+            <a:endParaRPr lang="en-US" altLang="zh-CN" sz="1000" b="0" i="0"/>
+          </a:p>
+          <a:p>
+            <a:pPr marL="0" algn="l">
+              <a:buClrTx/>
+              <a:buSzTx/>
+              <a:buNone/>
+            </a:pPr>
+            <a:r>
+              <a:rPr lang="en-US" altLang="zh-CN" sz="1000" b="0" i="0"/>
+              <a:t>ChildWrapperAddForm.propTypes = {</a:t>
+            </a:r>
+            <a:endParaRPr lang="en-US" altLang="zh-CN" sz="1000" b="0" i="0"/>
+          </a:p>
+          <a:p>
+            <a:pPr marL="0" algn="l">
+              <a:buClrTx/>
+              <a:buSzTx/>
+              <a:buNone/>
+            </a:pPr>
+            <a:r>
+              <a:rPr lang="en-US" altLang="zh-CN" sz="1000" b="0" i="0"/>
+              <a:t>  categorys: PropTypes.array.isRequired,</a:t>
+            </a:r>
+            <a:endParaRPr lang="en-US" altLang="zh-CN" sz="1000" b="0" i="0"/>
+          </a:p>
+          <a:p>
+            <a:pPr marL="0" algn="l">
+              <a:buClrTx/>
+              <a:buSzTx/>
+              <a:buNone/>
+            </a:pPr>
+            <a:r>
+              <a:rPr lang="en-US" altLang="zh-CN" sz="1000" b="0" i="0"/>
+              <a:t>  parentId: PropTypes.string.isRequired,</a:t>
+            </a:r>
+            <a:endParaRPr lang="en-US" altLang="zh-CN" sz="1000" b="0" i="0"/>
+          </a:p>
+          <a:p>
+            <a:pPr marL="0" algn="l">
+              <a:buClrTx/>
+              <a:buSzTx/>
+              <a:buNone/>
+            </a:pPr>
+            <a:r>
+              <a:rPr lang="en-US" altLang="zh-CN" sz="1000" b="0" i="0"/>
+              <a:t>};</a:t>
+            </a:r>
+            <a:endParaRPr lang="en-US" altLang="zh-CN" sz="1000" b="0" i="0"/>
+          </a:p>
+          <a:p>
+            <a:pPr marL="0" algn="l">
+              <a:buClrTx/>
+              <a:buSzTx/>
+              <a:buNone/>
+            </a:pPr>
+            <a:endParaRPr lang="en-US" altLang="zh-CN" sz="1000" b="0" i="0"/>
+          </a:p>
+          <a:p>
+            <a:pPr marL="0" algn="l">
+              <a:buClrTx/>
+              <a:buSzTx/>
+              <a:buNone/>
+            </a:pPr>
+            <a:r>
+              <a:rPr lang="en-US" altLang="zh-CN" sz="1000" b="0" i="0"/>
+              <a:t>export default ChildWrapperAddForm;</a:t>
+            </a:r>
+            <a:endParaRPr lang="en-US" altLang="zh-CN" sz="1000" b="0" i="0"/>
+          </a:p>
+          <a:p>
+            <a:pPr marL="0" algn="l">
+              <a:buClrTx/>
+              <a:buSzTx/>
+              <a:buNone/>
+            </a:pPr>
+            <a:endParaRPr lang="en-US" altLang="zh-CN" sz="1000" b="0" i="0"/>
+          </a:p>
+        </p:txBody>
+      </p:sp>
+      <p:sp>
+        <p:nvSpPr>
+          <p:cNvPr id="7" name="文本框 6"/>
+          <p:cNvSpPr txBox="1"/>
+          <p:nvPr/>
+        </p:nvSpPr>
+        <p:spPr>
+          <a:xfrm>
+            <a:off x="323850" y="1196340"/>
+            <a:ext cx="4572000" cy="3784600"/>
+          </a:xfrm>
+          <a:prstGeom prst="rect">
+            <a:avLst/>
+          </a:prstGeom>
+          <a:noFill/>
+        </p:spPr>
+        <p:txBody>
+          <a:bodyPr wrap="square" rtlCol="0" anchor="t">
+            <a:spAutoFit/>
+          </a:bodyPr>
+          <a:p>
+            <a:r>
+              <a:rPr lang="en-US" altLang="zh-CN" sz="1200"/>
+              <a:t>//  Parent Class Component</a:t>
+            </a:r>
+            <a:endParaRPr lang="en-US" altLang="zh-CN" sz="1200"/>
+          </a:p>
+          <a:p>
+            <a:r>
+              <a:rPr lang="en-US" altLang="zh-CN" sz="1200"/>
+              <a:t>class ParentComponent extends React.Component {</a:t>
+            </a:r>
+            <a:endParaRPr lang="en-US" altLang="zh-CN" sz="1200"/>
+          </a:p>
+          <a:p>
+            <a:r>
+              <a:rPr lang="en-US" altLang="zh-CN" sz="1200">
+                <a:solidFill>
+                  <a:srgbClr val="FF0000"/>
+                </a:solidFill>
+              </a:rPr>
+              <a:t>  formRef = React.createRef();</a:t>
+            </a:r>
+            <a:endParaRPr lang="en-US" altLang="zh-CN" sz="1200"/>
+          </a:p>
+          <a:p>
+            <a:r>
+              <a:rPr lang="en-US" altLang="zh-CN" sz="1200"/>
+              <a:t>  handleSubmit = () =&gt; {</a:t>
+            </a:r>
+            <a:endParaRPr lang="en-US" altLang="zh-CN" sz="1200"/>
+          </a:p>
+          <a:p>
+            <a:r>
+              <a:rPr lang="en-US" altLang="zh-CN" sz="1200"/>
+              <a:t>    this.formRef.current.validateFields()</a:t>
+            </a:r>
+            <a:endParaRPr lang="en-US" altLang="zh-CN" sz="1200"/>
+          </a:p>
+          <a:p>
+            <a:r>
+              <a:rPr lang="en-US" altLang="zh-CN" sz="1200"/>
+              <a:t>      .then(values =&gt; { console.log('Submitted values:', values);</a:t>
+            </a:r>
+            <a:endParaRPr lang="en-US" altLang="zh-CN" sz="1200"/>
+          </a:p>
+          <a:p>
+            <a:r>
+              <a:rPr lang="en-US" altLang="zh-CN" sz="1200"/>
+              <a:t>      })</a:t>
+            </a:r>
+            <a:endParaRPr lang="en-US" altLang="zh-CN" sz="1200"/>
+          </a:p>
+          <a:p>
+            <a:r>
+              <a:rPr lang="en-US" altLang="zh-CN" sz="1200"/>
+              <a:t> };</a:t>
+            </a:r>
+            <a:endParaRPr lang="en-US" altLang="zh-CN" sz="1200"/>
+          </a:p>
+          <a:p>
+            <a:r>
+              <a:rPr lang="en-US" altLang="zh-CN" sz="1200"/>
+              <a:t>  render() {</a:t>
+            </a:r>
+            <a:endParaRPr lang="en-US" altLang="zh-CN" sz="1200"/>
+          </a:p>
+          <a:p>
+            <a:r>
+              <a:rPr lang="en-US" altLang="zh-CN" sz="1200"/>
+              <a:t>    return (</a:t>
+            </a:r>
+            <a:endParaRPr lang="en-US" altLang="zh-CN" sz="1200"/>
+          </a:p>
+          <a:p>
+            <a:r>
+              <a:rPr lang="en-US" altLang="zh-CN" sz="1200"/>
+              <a:t>      &lt;div&gt;</a:t>
+            </a:r>
+            <a:endParaRPr lang="en-US" altLang="zh-CN" sz="1200"/>
+          </a:p>
+          <a:p>
+            <a:r>
+              <a:rPr lang="en-US" altLang="zh-CN" sz="1200"/>
+              <a:t>        </a:t>
+            </a:r>
+            <a:r>
+              <a:rPr lang="en-US" altLang="zh-CN" sz="1200">
+                <a:solidFill>
+                  <a:srgbClr val="FF0000"/>
+                </a:solidFill>
+              </a:rPr>
+              <a:t>&lt;</a:t>
+            </a:r>
+            <a:r>
+              <a:rPr lang="en-US" altLang="zh-CN" sz="1200">
+                <a:sym typeface="+mn-ea"/>
+              </a:rPr>
+              <a:t>ChildWrapperAddForm </a:t>
+            </a:r>
+            <a:endParaRPr lang="en-US" altLang="zh-CN" sz="1200">
+              <a:sym typeface="+mn-ea"/>
+            </a:endParaRPr>
+          </a:p>
+          <a:p>
+            <a:r>
+              <a:rPr lang="en-US" altLang="zh-CN" sz="1200">
+                <a:solidFill>
+                  <a:srgbClr val="FF0000"/>
+                </a:solidFill>
+              </a:rPr>
+              <a:t> categorys={categorys}</a:t>
+            </a:r>
+            <a:endParaRPr lang="en-US" altLang="zh-CN" sz="1200">
+              <a:solidFill>
+                <a:srgbClr val="FF0000"/>
+              </a:solidFill>
+            </a:endParaRPr>
+          </a:p>
+          <a:p>
+            <a:r>
+              <a:rPr lang="en-US" altLang="zh-CN" sz="1200">
+                <a:solidFill>
+                  <a:srgbClr val="FF0000"/>
+                </a:solidFill>
+              </a:rPr>
+              <a:t>             parentId={parentId}</a:t>
+            </a:r>
+            <a:endParaRPr lang="en-US" altLang="zh-CN" sz="1200">
+              <a:solidFill>
+                <a:srgbClr val="FF0000"/>
+              </a:solidFill>
+              <a:sym typeface="+mn-ea"/>
+            </a:endParaRPr>
+          </a:p>
+          <a:p>
+            <a:r>
+              <a:rPr lang="en-US" altLang="zh-CN" sz="1200">
+                <a:solidFill>
+                  <a:srgbClr val="FF0000"/>
+                </a:solidFill>
+              </a:rPr>
+              <a:t>ref={this.formRef} /&gt;</a:t>
+            </a:r>
+            <a:endParaRPr lang="en-US" altLang="zh-CN" sz="1200"/>
+          </a:p>
+          <a:p>
+            <a:r>
+              <a:rPr lang="en-US" altLang="zh-CN" sz="1200"/>
+              <a:t>        &lt;Button onClick={this.handleSubmit} type="primary"&gt;&lt;/Button&gt;&lt;/div&gt;</a:t>
+            </a:r>
+            <a:endParaRPr lang="en-US" altLang="zh-CN" sz="1200"/>
+          </a:p>
+          <a:p>
+            <a:r>
+              <a:rPr lang="en-US" altLang="zh-CN" sz="1200"/>
+              <a:t>    );}}</a:t>
+            </a:r>
+            <a:endParaRPr lang="en-US" altLang="zh-CN" sz="1200"/>
+          </a:p>
+          <a:p>
+            <a:endParaRPr lang="en-US" altLang="zh-CN" sz="1200"/>
+          </a:p>
+          <a:p>
+            <a:r>
+              <a:rPr lang="en-US" altLang="zh-CN" sz="1200"/>
+              <a:t>export default ParentComponent;</a:t>
+            </a:r>
+            <a:endParaRPr lang="zh-CN" altLang="en-US" sz="1200"/>
+          </a:p>
+        </p:txBody>
+      </p:sp>
+    </p:spTree>
+  </p:cSld>
+  <p:clrMapOvr>
+    <a:masterClrMapping/>
+  </p:clrMapOvr>
+</p:sld>
+</file>
+
+<file path=ppt/slides/slide23.xml><?xml version="1.0" encoding="utf-8"?>
+<p:sld xmlns:a="http://schemas.openxmlformats.org/drawingml/2006/main" xmlns:r="http://schemas.openxmlformats.org/officeDocument/2006/relationships" xmlns:p="http://schemas.openxmlformats.org/presentationml/2006/main">
+  <p:cSld>
+    <p:spTree>
+      <p:nvGrpSpPr>
+        <p:cNvPr id="1" name=""/>
+        <p:cNvGrpSpPr/>
+        <p:nvPr/>
+      </p:nvGrpSpPr>
+      <p:grpSpPr/>
+      <p:sp>
+        <p:nvSpPr>
+          <p:cNvPr id="2" name="标题 1"/>
+          <p:cNvSpPr>
+            <a:spLocks noGrp="1"/>
+          </p:cNvSpPr>
+          <p:nvPr>
+            <p:ph type="title"/>
+          </p:nvPr>
+        </p:nvSpPr>
+        <p:spPr>
+          <a:xfrm>
+            <a:off x="457200" y="-171767"/>
+            <a:ext cx="8229600" cy="1143000"/>
+          </a:xfrm>
+        </p:spPr>
+        <p:txBody>
+          <a:bodyPr/>
+          <a:p>
+            <a:r>
+              <a:rPr lang="en-US" altLang="zh-CN"/>
+              <a:t>Pass child form to Parent(2)</a:t>
+            </a:r>
+            <a:endParaRPr lang="zh-CN" altLang="en-US"/>
+          </a:p>
+        </p:txBody>
+      </p:sp>
+      <p:sp>
+        <p:nvSpPr>
+          <p:cNvPr id="3" name="内容占位符 2"/>
+          <p:cNvSpPr>
+            <a:spLocks noGrp="1"/>
+          </p:cNvSpPr>
+          <p:nvPr>
+            <p:ph idx="1"/>
+          </p:nvPr>
+        </p:nvSpPr>
+        <p:spPr>
+          <a:xfrm>
+            <a:off x="467995" y="826135"/>
+            <a:ext cx="8229600" cy="4525963"/>
+          </a:xfrm>
+        </p:spPr>
+        <p:txBody>
+          <a:bodyPr/>
+          <a:p>
+            <a:r>
+              <a:rPr lang="en-US" altLang="zh-CN" sz="1200" b="1"/>
+              <a:t>ref clas child component</a:t>
+            </a:r>
+            <a:endParaRPr lang="en-US" altLang="zh-CN" sz="1200" b="1"/>
+          </a:p>
+          <a:p>
+            <a:pPr marL="1371600" lvl="3" indent="0" algn="just">
+              <a:buNone/>
+            </a:pPr>
+            <a:r>
+              <a:rPr lang="en-US" altLang="zh-CN" sz="750"/>
+              <a:t> </a:t>
+            </a:r>
+            <a:endParaRPr lang="en-US" altLang="zh-CN" sz="750"/>
+          </a:p>
+        </p:txBody>
+      </p:sp>
+      <p:sp>
+        <p:nvSpPr>
+          <p:cNvPr id="4" name="文本框 3"/>
+          <p:cNvSpPr txBox="1"/>
+          <p:nvPr/>
+        </p:nvSpPr>
+        <p:spPr>
+          <a:xfrm>
+            <a:off x="4860290" y="1600200"/>
+            <a:ext cx="4684395" cy="2516505"/>
+          </a:xfrm>
+          <a:prstGeom prst="rect">
+            <a:avLst/>
+          </a:prstGeom>
+          <a:noFill/>
+        </p:spPr>
+        <p:txBody>
+          <a:bodyPr wrap="square" rtlCol="0" anchor="t">
+            <a:noAutofit/>
+          </a:bodyPr>
+          <a:p>
+            <a:pPr marL="1371600" lvl="3" indent="0" algn="just">
+              <a:buNone/>
+            </a:pPr>
+            <a:r>
+              <a:rPr lang="en-US" altLang="zh-CN" sz="1000">
+                <a:sym typeface="+mn-ea"/>
+              </a:rPr>
+              <a:t> 	</a:t>
+            </a:r>
+            <a:endParaRPr lang="en-US" altLang="zh-CN" sz="1000">
+              <a:sym typeface="+mn-ea"/>
+            </a:endParaRPr>
+          </a:p>
+        </p:txBody>
+      </p:sp>
+      <p:sp>
+        <p:nvSpPr>
+          <p:cNvPr id="5" name="文本框 4"/>
+          <p:cNvSpPr txBox="1"/>
+          <p:nvPr/>
+        </p:nvSpPr>
+        <p:spPr>
+          <a:xfrm>
+            <a:off x="4932045" y="1268730"/>
+            <a:ext cx="5542280" cy="3223895"/>
+          </a:xfrm>
+          <a:prstGeom prst="rect">
+            <a:avLst/>
+          </a:prstGeom>
+        </p:spPr>
+        <p:txBody>
+          <a:bodyPr>
+            <a:noAutofit/>
+          </a:bodyPr>
+          <a:p>
+            <a:pPr marL="0" algn="l">
+              <a:buClrTx/>
+              <a:buSzTx/>
+              <a:buNone/>
+            </a:pPr>
+            <a:r>
+              <a:rPr lang="en-US" altLang="zh-CN" sz="1200" b="0" i="0">
+                <a:solidFill>
+                  <a:srgbClr val="81A1C1"/>
+                </a:solidFill>
+                <a:latin typeface="+mj-lt"/>
+                <a:ea typeface="Menlo"/>
+                <a:cs typeface="+mj-lt"/>
+              </a:rPr>
+              <a:t>//</a:t>
+            </a:r>
+            <a:r>
+              <a:rPr lang="en-US" altLang="zh-CN" sz="1200" b="0" i="0"/>
+              <a:t> Child class Component</a:t>
+            </a:r>
+            <a:endParaRPr lang="en-US" altLang="zh-CN" sz="1200" b="0" i="0"/>
+          </a:p>
+          <a:p>
+            <a:pPr marL="0" algn="l">
+              <a:buClrTx/>
+              <a:buSzTx/>
+              <a:buNone/>
+            </a:pPr>
+            <a:r>
+              <a:rPr lang="en-US" altLang="zh-CN" sz="1200">
+                <a:sym typeface="+mn-ea"/>
+              </a:rPr>
+              <a:t>class ChildForm extends React.Component {</a:t>
+            </a:r>
+            <a:endParaRPr lang="en-US" altLang="zh-CN" sz="1200"/>
+          </a:p>
+          <a:p>
+            <a:pPr marL="0" algn="l">
+              <a:buClrTx/>
+              <a:buSzTx/>
+              <a:buNone/>
+            </a:pPr>
+            <a:r>
+              <a:rPr lang="en-US" altLang="zh-CN" sz="1200">
+                <a:solidFill>
+                  <a:srgbClr val="FF0000"/>
+                </a:solidFill>
+                <a:sym typeface="+mn-ea"/>
+              </a:rPr>
+              <a:t>  formRef = React.createRef();</a:t>
+            </a:r>
+            <a:endParaRPr lang="en-US" altLang="zh-CN" sz="1200">
+              <a:solidFill>
+                <a:srgbClr val="FF0000"/>
+              </a:solidFill>
+            </a:endParaRPr>
+          </a:p>
+          <a:p>
+            <a:pPr marL="0" algn="l">
+              <a:buClrTx/>
+              <a:buSzTx/>
+              <a:buNone/>
+            </a:pPr>
+            <a:endParaRPr lang="en-US" altLang="zh-CN" sz="1200"/>
+          </a:p>
+          <a:p>
+            <a:pPr marL="0" algn="l">
+              <a:buClrTx/>
+              <a:buSzTx/>
+              <a:buNone/>
+            </a:pPr>
+            <a:r>
+              <a:rPr lang="en-US" altLang="zh-CN" sz="1200">
+                <a:sym typeface="+mn-ea"/>
+              </a:rPr>
+              <a:t>  // Expose form methods to parent</a:t>
+            </a:r>
+            <a:endParaRPr lang="en-US" altLang="zh-CN" sz="1200"/>
+          </a:p>
+          <a:p>
+            <a:pPr marL="0" algn="l">
+              <a:buClrTx/>
+              <a:buSzTx/>
+              <a:buNone/>
+            </a:pPr>
+            <a:r>
+              <a:rPr lang="en-US" altLang="zh-CN" sz="1200">
+                <a:solidFill>
+                  <a:srgbClr val="FF0000"/>
+                </a:solidFill>
+                <a:sym typeface="+mn-ea"/>
+              </a:rPr>
+              <a:t>  getFormInstance = () =&gt; {</a:t>
+            </a:r>
+            <a:endParaRPr lang="en-US" altLang="zh-CN" sz="1200">
+              <a:solidFill>
+                <a:srgbClr val="FF0000"/>
+              </a:solidFill>
+            </a:endParaRPr>
+          </a:p>
+          <a:p>
+            <a:pPr marL="0" algn="l">
+              <a:buClrTx/>
+              <a:buSzTx/>
+              <a:buNone/>
+            </a:pPr>
+            <a:r>
+              <a:rPr lang="en-US" altLang="zh-CN" sz="1200">
+                <a:solidFill>
+                  <a:srgbClr val="FF0000"/>
+                </a:solidFill>
+                <a:sym typeface="+mn-ea"/>
+              </a:rPr>
+              <a:t>    return this.formRef.current;</a:t>
+            </a:r>
+            <a:endParaRPr lang="en-US" altLang="zh-CN" sz="1200">
+              <a:solidFill>
+                <a:srgbClr val="FF0000"/>
+              </a:solidFill>
+            </a:endParaRPr>
+          </a:p>
+          <a:p>
+            <a:pPr marL="0" algn="l">
+              <a:buClrTx/>
+              <a:buSzTx/>
+              <a:buNone/>
+            </a:pPr>
+            <a:r>
+              <a:rPr lang="en-US" altLang="zh-CN" sz="1200">
+                <a:solidFill>
+                  <a:srgbClr val="FF0000"/>
+                </a:solidFill>
+                <a:sym typeface="+mn-ea"/>
+              </a:rPr>
+              <a:t>  };</a:t>
+            </a:r>
+            <a:endParaRPr lang="en-US" altLang="zh-CN" sz="1200">
+              <a:solidFill>
+                <a:srgbClr val="FF0000"/>
+              </a:solidFill>
+            </a:endParaRPr>
+          </a:p>
+          <a:p>
+            <a:pPr marL="0" algn="l">
+              <a:buClrTx/>
+              <a:buSzTx/>
+              <a:buNone/>
+            </a:pPr>
+            <a:endParaRPr lang="en-US" altLang="zh-CN" sz="1200"/>
+          </a:p>
+          <a:p>
+            <a:pPr marL="0" algn="l">
+              <a:buClrTx/>
+              <a:buSzTx/>
+              <a:buNone/>
+            </a:pPr>
+            <a:r>
+              <a:rPr lang="en-US" altLang="zh-CN" sz="1200">
+                <a:sym typeface="+mn-ea"/>
+              </a:rPr>
+              <a:t>  render() {</a:t>
+            </a:r>
+            <a:endParaRPr lang="en-US" altLang="zh-CN" sz="1200"/>
+          </a:p>
+          <a:p>
+            <a:pPr marL="0" algn="l">
+              <a:buClrTx/>
+              <a:buSzTx/>
+              <a:buNone/>
+            </a:pPr>
+            <a:r>
+              <a:rPr lang="en-US" altLang="zh-CN" sz="1200">
+                <a:sym typeface="+mn-ea"/>
+              </a:rPr>
+              <a:t>    return (</a:t>
+            </a:r>
+            <a:endParaRPr lang="en-US" altLang="zh-CN" sz="1200"/>
+          </a:p>
+          <a:p>
+            <a:pPr marL="0" algn="l">
+              <a:buClrTx/>
+              <a:buSzTx/>
+              <a:buNone/>
+            </a:pPr>
+            <a:r>
+              <a:rPr lang="en-US" altLang="zh-CN" sz="1200">
+                <a:sym typeface="+mn-ea"/>
+              </a:rPr>
+              <a:t>      &lt;Form </a:t>
+            </a:r>
+            <a:r>
+              <a:rPr lang="en-US" altLang="zh-CN" sz="1200">
+                <a:solidFill>
+                  <a:srgbClr val="FF0000"/>
+                </a:solidFill>
+                <a:sym typeface="+mn-ea"/>
+              </a:rPr>
+              <a:t>ref={this.formRef}</a:t>
+            </a:r>
+            <a:r>
+              <a:rPr lang="en-US" altLang="zh-CN" sz="1200">
+                <a:sym typeface="+mn-ea"/>
+              </a:rPr>
+              <a:t> layout="vertical"&gt;</a:t>
+            </a:r>
+            <a:endParaRPr lang="en-US" altLang="zh-CN" sz="1200"/>
+          </a:p>
+          <a:p>
+            <a:pPr marL="0" algn="l">
+              <a:buClrTx/>
+              <a:buSzTx/>
+              <a:buNone/>
+            </a:pPr>
+            <a:r>
+              <a:rPr lang="en-US" altLang="zh-CN" sz="1200">
+                <a:sym typeface="+mn-ea"/>
+              </a:rPr>
+              <a:t>        &lt;Form.Item</a:t>
+            </a:r>
+            <a:endParaRPr lang="en-US" altLang="zh-CN" sz="1200"/>
+          </a:p>
+          <a:p>
+            <a:pPr marL="0" algn="l">
+              <a:buClrTx/>
+              <a:buSzTx/>
+              <a:buNone/>
+            </a:pPr>
+            <a:r>
+              <a:rPr lang="en-US" altLang="zh-CN" sz="1200">
+                <a:sym typeface="+mn-ea"/>
+              </a:rPr>
+              <a:t>          name="username"</a:t>
+            </a:r>
+            <a:endParaRPr lang="en-US" altLang="zh-CN" sz="1200"/>
+          </a:p>
+          <a:p>
+            <a:pPr marL="0" algn="l">
+              <a:buClrTx/>
+              <a:buSzTx/>
+              <a:buNone/>
+            </a:pPr>
+            <a:r>
+              <a:rPr lang="en-US" altLang="zh-CN" sz="1200">
+                <a:sym typeface="+mn-ea"/>
+              </a:rPr>
+              <a:t>          label="Username"</a:t>
+            </a:r>
+            <a:endParaRPr lang="en-US" altLang="zh-CN" sz="1200"/>
+          </a:p>
+          <a:p>
+            <a:pPr marL="0" algn="l">
+              <a:buClrTx/>
+              <a:buSzTx/>
+              <a:buNone/>
+            </a:pPr>
+            <a:r>
+              <a:rPr lang="en-US" altLang="zh-CN" sz="1200">
+                <a:sym typeface="+mn-ea"/>
+              </a:rPr>
+              <a:t>          rules={[{ required: true, message: 'Required!' }]}</a:t>
+            </a:r>
+            <a:endParaRPr lang="en-US" altLang="zh-CN" sz="1200"/>
+          </a:p>
+          <a:p>
+            <a:pPr marL="0" algn="l">
+              <a:buClrTx/>
+              <a:buSzTx/>
+              <a:buNone/>
+            </a:pPr>
+            <a:r>
+              <a:rPr lang="en-US" altLang="zh-CN" sz="1200">
+                <a:sym typeface="+mn-ea"/>
+              </a:rPr>
+              <a:t>        &gt;</a:t>
+            </a:r>
+            <a:endParaRPr lang="en-US" altLang="zh-CN" sz="1200"/>
+          </a:p>
+          <a:p>
+            <a:pPr marL="0" algn="l">
+              <a:buClrTx/>
+              <a:buSzTx/>
+              <a:buNone/>
+            </a:pPr>
+            <a:r>
+              <a:rPr lang="en-US" altLang="zh-CN" sz="1200">
+                <a:sym typeface="+mn-ea"/>
+              </a:rPr>
+              <a:t>          &lt;Input /&gt;</a:t>
+            </a:r>
+            <a:endParaRPr lang="en-US" altLang="zh-CN" sz="1200"/>
+          </a:p>
+          <a:p>
+            <a:pPr marL="0" algn="l">
+              <a:buClrTx/>
+              <a:buSzTx/>
+              <a:buNone/>
+            </a:pPr>
+            <a:r>
+              <a:rPr lang="en-US" altLang="zh-CN" sz="1200">
+                <a:sym typeface="+mn-ea"/>
+              </a:rPr>
+              <a:t>        &lt;/Form.Item&gt;</a:t>
+            </a:r>
+            <a:endParaRPr lang="en-US" altLang="zh-CN" sz="1200"/>
+          </a:p>
+          <a:p>
+            <a:pPr marL="0" algn="l">
+              <a:buClrTx/>
+              <a:buSzTx/>
+              <a:buNone/>
+            </a:pPr>
+            <a:r>
+              <a:rPr lang="en-US" altLang="zh-CN" sz="1200">
+                <a:sym typeface="+mn-ea"/>
+              </a:rPr>
+              <a:t>      &lt;/Form&gt;</a:t>
+            </a:r>
+            <a:endParaRPr lang="en-US" altLang="zh-CN" sz="1200"/>
+          </a:p>
+          <a:p>
+            <a:pPr marL="0" algn="l">
+              <a:buClrTx/>
+              <a:buSzTx/>
+              <a:buNone/>
+            </a:pPr>
+            <a:r>
+              <a:rPr lang="en-US" altLang="zh-CN" sz="1200">
+                <a:sym typeface="+mn-ea"/>
+              </a:rPr>
+              <a:t>    );</a:t>
+            </a:r>
+            <a:endParaRPr lang="en-US" altLang="zh-CN" sz="1200"/>
+          </a:p>
+          <a:p>
+            <a:pPr marL="0" algn="l">
+              <a:buClrTx/>
+              <a:buSzTx/>
+              <a:buNone/>
+            </a:pPr>
+            <a:r>
+              <a:rPr lang="en-US" altLang="zh-CN" sz="1200">
+                <a:sym typeface="+mn-ea"/>
+              </a:rPr>
+              <a:t>  }</a:t>
+            </a:r>
+            <a:endParaRPr lang="en-US" altLang="zh-CN" sz="1200"/>
+          </a:p>
+          <a:p>
+            <a:pPr marL="0" algn="l">
+              <a:buClrTx/>
+              <a:buSzTx/>
+              <a:buNone/>
+            </a:pPr>
+            <a:r>
+              <a:rPr lang="en-US" altLang="zh-CN" sz="1200">
+                <a:sym typeface="+mn-ea"/>
+              </a:rPr>
+              <a:t>}</a:t>
+            </a:r>
+            <a:endParaRPr lang="en-US" altLang="zh-CN" sz="1200"/>
+          </a:p>
+          <a:p>
+            <a:pPr marL="0" algn="l">
+              <a:buClrTx/>
+              <a:buSzTx/>
+              <a:buNone/>
+            </a:pPr>
+            <a:endParaRPr lang="en-US" altLang="zh-CN" sz="1200" b="0" i="0"/>
+          </a:p>
+        </p:txBody>
+      </p:sp>
+      <p:sp>
+        <p:nvSpPr>
+          <p:cNvPr id="7" name="文本框 6"/>
+          <p:cNvSpPr txBox="1"/>
+          <p:nvPr/>
+        </p:nvSpPr>
+        <p:spPr>
+          <a:xfrm>
+            <a:off x="323850" y="1196340"/>
+            <a:ext cx="4572000" cy="5262245"/>
+          </a:xfrm>
+          <a:prstGeom prst="rect">
+            <a:avLst/>
+          </a:prstGeom>
+          <a:noFill/>
+        </p:spPr>
+        <p:txBody>
+          <a:bodyPr wrap="square" rtlCol="0" anchor="t">
+            <a:spAutoFit/>
+          </a:bodyPr>
+          <a:p>
+            <a:r>
+              <a:rPr lang="en-US" altLang="zh-CN" sz="1200"/>
+              <a:t>//  Parent Class Component</a:t>
+            </a:r>
+            <a:endParaRPr lang="en-US" altLang="zh-CN" sz="1200"/>
+          </a:p>
+          <a:p>
+            <a:endParaRPr lang="en-US" altLang="zh-CN" sz="1200"/>
+          </a:p>
+          <a:p>
+            <a:r>
+              <a:rPr lang="en-US" altLang="zh-CN" sz="1200"/>
+              <a:t>// 2. Parent Class Component</a:t>
+            </a:r>
+            <a:endParaRPr lang="en-US" altLang="zh-CN" sz="1200"/>
+          </a:p>
+          <a:p>
+            <a:r>
+              <a:rPr lang="en-US" altLang="zh-CN" sz="1200"/>
+              <a:t>class ParentComponent extends React.Component {</a:t>
+            </a:r>
+            <a:endParaRPr lang="en-US" altLang="zh-CN" sz="1200"/>
+          </a:p>
+          <a:p>
+            <a:r>
+              <a:rPr lang="en-US" altLang="zh-CN" sz="1200"/>
+              <a:t>  </a:t>
+            </a:r>
+            <a:r>
+              <a:rPr lang="en-US" altLang="zh-CN" sz="1200">
+                <a:solidFill>
+                  <a:srgbClr val="FF0000"/>
+                </a:solidFill>
+              </a:rPr>
+              <a:t>childRef = React.createRef();</a:t>
+            </a:r>
+            <a:endParaRPr lang="en-US" altLang="zh-CN" sz="1200">
+              <a:solidFill>
+                <a:srgbClr val="FF0000"/>
+              </a:solidFill>
+            </a:endParaRPr>
+          </a:p>
+          <a:p>
+            <a:endParaRPr lang="en-US" altLang="zh-CN" sz="1200">
+              <a:solidFill>
+                <a:srgbClr val="FF0000"/>
+              </a:solidFill>
+            </a:endParaRPr>
+          </a:p>
+          <a:p>
+            <a:r>
+              <a:rPr lang="en-US" altLang="zh-CN" sz="1200"/>
+              <a:t>  handleSubmit = () =&gt; {</a:t>
+            </a:r>
+            <a:endParaRPr lang="en-US" altLang="zh-CN" sz="1200"/>
+          </a:p>
+          <a:p>
+            <a:r>
+              <a:rPr lang="en-US" altLang="zh-CN" sz="1200"/>
+              <a:t>    </a:t>
+            </a:r>
+            <a:r>
+              <a:rPr lang="en-US" altLang="zh-CN" sz="1200">
+                <a:solidFill>
+                  <a:srgbClr val="FF0000"/>
+                </a:solidFill>
+              </a:rPr>
+              <a:t>this.childRef.current.getFormInstance()</a:t>
+            </a:r>
+            <a:r>
+              <a:rPr lang="en-US" altLang="zh-CN" sz="1200"/>
+              <a:t>.validateFields()</a:t>
+            </a:r>
+            <a:endParaRPr lang="en-US" altLang="zh-CN" sz="1200"/>
+          </a:p>
+          <a:p>
+            <a:r>
+              <a:rPr lang="en-US" altLang="zh-CN" sz="1200"/>
+              <a:t>      .then(values =&gt; {</a:t>
+            </a:r>
+            <a:endParaRPr lang="en-US" altLang="zh-CN" sz="1200"/>
+          </a:p>
+          <a:p>
+            <a:r>
+              <a:rPr lang="en-US" altLang="zh-CN" sz="1200"/>
+              <a:t>        console.log('Submitted:', values);</a:t>
+            </a:r>
+            <a:endParaRPr lang="en-US" altLang="zh-CN" sz="1200"/>
+          </a:p>
+          <a:p>
+            <a:r>
+              <a:rPr lang="en-US" altLang="zh-CN" sz="1200"/>
+              <a:t>      })</a:t>
+            </a:r>
+            <a:endParaRPr lang="en-US" altLang="zh-CN" sz="1200"/>
+          </a:p>
+          <a:p>
+            <a:r>
+              <a:rPr lang="en-US" altLang="zh-CN" sz="1200"/>
+              <a:t>      .catch(err =&gt; {</a:t>
+            </a:r>
+            <a:endParaRPr lang="en-US" altLang="zh-CN" sz="1200"/>
+          </a:p>
+          <a:p>
+            <a:r>
+              <a:rPr lang="en-US" altLang="zh-CN" sz="1200"/>
+              <a:t>        console.error('Validation failed:', err);</a:t>
+            </a:r>
+            <a:endParaRPr lang="en-US" altLang="zh-CN" sz="1200"/>
+          </a:p>
+          <a:p>
+            <a:r>
+              <a:rPr lang="en-US" altLang="zh-CN" sz="1200"/>
+              <a:t>      });</a:t>
+            </a:r>
+            <a:endParaRPr lang="en-US" altLang="zh-CN" sz="1200"/>
+          </a:p>
+          <a:p>
+            <a:r>
+              <a:rPr lang="en-US" altLang="zh-CN" sz="1200"/>
+              <a:t>  };</a:t>
+            </a:r>
+            <a:endParaRPr lang="en-US" altLang="zh-CN" sz="1200"/>
+          </a:p>
+          <a:p>
+            <a:r>
+              <a:rPr lang="en-US" altLang="zh-CN" sz="1200"/>
+              <a:t>  render() {</a:t>
+            </a:r>
+            <a:endParaRPr lang="en-US" altLang="zh-CN" sz="1200"/>
+          </a:p>
+          <a:p>
+            <a:r>
+              <a:rPr lang="en-US" altLang="zh-CN" sz="1200"/>
+              <a:t>    return (</a:t>
+            </a:r>
+            <a:endParaRPr lang="en-US" altLang="zh-CN" sz="1200"/>
+          </a:p>
+          <a:p>
+            <a:r>
+              <a:rPr lang="en-US" altLang="zh-CN" sz="1200"/>
+              <a:t>      &lt;div&gt;</a:t>
+            </a:r>
+            <a:endParaRPr lang="en-US" altLang="zh-CN" sz="1200"/>
+          </a:p>
+          <a:p>
+            <a:r>
+              <a:rPr lang="en-US" altLang="zh-CN" sz="1200"/>
+              <a:t>        &lt;ChildForm </a:t>
+            </a:r>
+            <a:r>
+              <a:rPr lang="en-US" altLang="zh-CN" sz="1200">
+                <a:solidFill>
+                  <a:srgbClr val="FF0000"/>
+                </a:solidFill>
+              </a:rPr>
+              <a:t>ref={this.childRef}</a:t>
+            </a:r>
+            <a:r>
+              <a:rPr lang="en-US" altLang="zh-CN" sz="1200"/>
+              <a:t> /&gt;</a:t>
+            </a:r>
+            <a:endParaRPr lang="en-US" altLang="zh-CN" sz="1200"/>
+          </a:p>
+          <a:p>
+            <a:r>
+              <a:rPr lang="en-US" altLang="zh-CN" sz="1200"/>
+              <a:t>        &lt;Button onClick={this.handleSubmit} type="primary"&gt;</a:t>
+            </a:r>
+            <a:endParaRPr lang="en-US" altLang="zh-CN" sz="1200"/>
+          </a:p>
+          <a:p>
+            <a:r>
+              <a:rPr lang="en-US" altLang="zh-CN" sz="1200"/>
+              <a:t>          Submit from Parent</a:t>
+            </a:r>
+            <a:endParaRPr lang="en-US" altLang="zh-CN" sz="1200"/>
+          </a:p>
+          <a:p>
+            <a:r>
+              <a:rPr lang="en-US" altLang="zh-CN" sz="1200"/>
+              <a:t>        &lt;/Button&gt;</a:t>
+            </a:r>
+            <a:endParaRPr lang="en-US" altLang="zh-CN" sz="1200"/>
+          </a:p>
+          <a:p>
+            <a:r>
+              <a:rPr lang="en-US" altLang="zh-CN" sz="1200"/>
+              <a:t>      &lt;/div&gt;</a:t>
+            </a:r>
+            <a:endParaRPr lang="en-US" altLang="zh-CN" sz="1200"/>
+          </a:p>
+          <a:p>
+            <a:r>
+              <a:rPr lang="en-US" altLang="zh-CN" sz="1200"/>
+              <a:t>    );</a:t>
+            </a:r>
+            <a:endParaRPr lang="en-US" altLang="zh-CN" sz="1200"/>
+          </a:p>
+          <a:p>
+            <a:r>
+              <a:rPr lang="en-US" altLang="zh-CN" sz="1200"/>
+              <a:t>  }</a:t>
+            </a:r>
+            <a:endParaRPr lang="en-US" altLang="zh-CN" sz="1200"/>
+          </a:p>
+          <a:p>
+            <a:r>
+              <a:rPr lang="en-US" altLang="zh-CN" sz="1200"/>
+              <a:t>}</a:t>
+            </a:r>
+            <a:endParaRPr lang="en-US" altLang="zh-CN" sz="1200"/>
+          </a:p>
+          <a:p>
+            <a:endParaRPr lang="en-US" altLang="zh-CN" sz="1200"/>
+          </a:p>
+          <a:p>
+            <a:r>
+              <a:rPr lang="en-US" altLang="zh-CN" sz="1200"/>
+              <a:t>export default ParentComponent;</a:t>
             </a:r>
             <a:endParaRPr lang="en-US" altLang="zh-CN" sz="1200"/>
           </a:p>

</xml_diff>